<commit_message>
final slides from presentation
</commit_message>
<xml_diff>
--- a/code/skyhawks_presentation.pptx
+++ b/code/skyhawks_presentation.pptx
@@ -279,7 +279,7 @@
       </p15:sldGuideLst>
     </p:ext>
     <p:ext uri="http://customooxmlschemas.google.com/">
-      <go:slidesCustomData xmlns:go="http://customooxmlschemas.google.com/" xmlns:p15="http://schemas.microsoft.com/office/powerpoint/2012/main" xmlns:p14="http://schemas.microsoft.com/office/powerpoint/2010/main" xmlns:com="http://schemas.openxmlformats.org/drawingml/2006/compatibility" xmlns:pvml="urn:schemas-microsoft-com:office:powerpoint" xmlns:v="urn:schemas-microsoft-com:vml" xmlns:o="urn:schemas-microsoft-com:office:office" xmlns:dgm="http://schemas.openxmlformats.org/drawingml/2006/diagram" xmlns:c="http://schemas.openxmlformats.org/drawingml/2006/chart" xmlns:mv="urn:schemas-microsoft-com:mac:vml" xmlns:mc="http://schemas.openxmlformats.org/markup-compatibility/2006" xmlns="" r:id="rId30" roundtripDataSignature="AMtx7mhFn+gcyQ036oYda9UM3h3aHgNfCw=="/>
+      <go:slidesCustomData xmlns="" xmlns:mc="http://schemas.openxmlformats.org/markup-compatibility/2006" xmlns:mv="urn:schemas-microsoft-com:mac:vml" xmlns:c="http://schemas.openxmlformats.org/drawingml/2006/chart" xmlns:dgm="http://schemas.openxmlformats.org/drawingml/2006/diagram" xmlns:o="urn:schemas-microsoft-com:office:office" xmlns:v="urn:schemas-microsoft-com:vml" xmlns:pvml="urn:schemas-microsoft-com:office:powerpoint" xmlns:com="http://schemas.openxmlformats.org/drawingml/2006/compatibility" xmlns:p14="http://schemas.microsoft.com/office/powerpoint/2010/main" xmlns:p15="http://schemas.microsoft.com/office/powerpoint/2012/main" xmlns:go="http://customooxmlschemas.google.com/" r:id="rId30" roundtripDataSignature="AMtx7mhFn+gcyQ036oYda9UM3h3aHgNfCw=="/>
     </p:ext>
   </p:extLst>
 </p:presentation>
@@ -3469,7 +3469,7 @@
         <p:spPr>
           <a:xfrm>
             <a:off x="1181100" y="696913"/>
-            <a:ext cx="4648200" cy="3486300"/>
+            <a:ext cx="4648200" cy="3486150"/>
           </a:xfrm>
           <a:custGeom>
             <a:avLst/>
@@ -22361,7 +22361,7 @@
         </p:nvGraphicFramePr>
         <p:xfrm>
           <a:off x="304775" y="2014150"/>
-          <a:ext cx="3000000" cy="3000000"/>
+          <a:ext cx="8534425" cy="1868900"/>
         </p:xfrm>
         <a:graphic>
           <a:graphicData uri="http://schemas.openxmlformats.org/drawingml/2006/table">
@@ -22464,7 +22464,7 @@
                     </a:lnB>
                     <a:extLst>
                       <a:ext uri="http://customooxmlschemas.google.com/">
-                        <go:slidesCustomData xmlns:go="http://customooxmlschemas.google.com/" xmlns:p15="http://schemas.microsoft.com/office/powerpoint/2012/main" xmlns:p14="http://schemas.microsoft.com/office/powerpoint/2010/main" xmlns:com="http://schemas.openxmlformats.org/drawingml/2006/compatibility" xmlns:pvml="urn:schemas-microsoft-com:office:powerpoint" xmlns:v="urn:schemas-microsoft-com:vml" xmlns:o="urn:schemas-microsoft-com:office:office" xmlns:dgm="http://schemas.openxmlformats.org/drawingml/2006/diagram" xmlns:c="http://schemas.openxmlformats.org/drawingml/2006/chart" xmlns:mv="urn:schemas-microsoft-com:mac:vml" xmlns:mc="http://schemas.openxmlformats.org/markup-compatibility/2006" xmlns="" cellId="238:0:0"/>
+                        <go:slidesCustomData xmlns="" xmlns:mc="http://schemas.openxmlformats.org/markup-compatibility/2006" xmlns:mv="urn:schemas-microsoft-com:mac:vml" xmlns:c="http://schemas.openxmlformats.org/drawingml/2006/chart" xmlns:dgm="http://schemas.openxmlformats.org/drawingml/2006/diagram" xmlns:o="urn:schemas-microsoft-com:office:office" xmlns:v="urn:schemas-microsoft-com:vml" xmlns:pvml="urn:schemas-microsoft-com:office:powerpoint" xmlns:com="http://schemas.openxmlformats.org/drawingml/2006/compatibility" xmlns:p14="http://schemas.microsoft.com/office/powerpoint/2010/main" xmlns:p15="http://schemas.microsoft.com/office/powerpoint/2012/main" xmlns:go="http://customooxmlschemas.google.com/" cellId="238:0:0"/>
                       </a:ext>
                     </a:extLst>
                   </a:tcPr>
@@ -22543,7 +22543,7 @@
                     </a:solidFill>
                     <a:extLst>
                       <a:ext uri="http://customooxmlschemas.google.com/">
-                        <go:slidesCustomData xmlns:go="http://customooxmlschemas.google.com/" xmlns:p15="http://schemas.microsoft.com/office/powerpoint/2012/main" xmlns:p14="http://schemas.microsoft.com/office/powerpoint/2010/main" xmlns:com="http://schemas.openxmlformats.org/drawingml/2006/compatibility" xmlns:pvml="urn:schemas-microsoft-com:office:powerpoint" xmlns:v="urn:schemas-microsoft-com:vml" xmlns:o="urn:schemas-microsoft-com:office:office" xmlns:dgm="http://schemas.openxmlformats.org/drawingml/2006/diagram" xmlns:c="http://schemas.openxmlformats.org/drawingml/2006/chart" xmlns:mv="urn:schemas-microsoft-com:mac:vml" xmlns:mc="http://schemas.openxmlformats.org/markup-compatibility/2006" xmlns="" cellId="238:0:1"/>
+                        <go:slidesCustomData xmlns="" xmlns:mc="http://schemas.openxmlformats.org/markup-compatibility/2006" xmlns:mv="urn:schemas-microsoft-com:mac:vml" xmlns:c="http://schemas.openxmlformats.org/drawingml/2006/chart" xmlns:dgm="http://schemas.openxmlformats.org/drawingml/2006/diagram" xmlns:o="urn:schemas-microsoft-com:office:office" xmlns:v="urn:schemas-microsoft-com:vml" xmlns:pvml="urn:schemas-microsoft-com:office:powerpoint" xmlns:com="http://schemas.openxmlformats.org/drawingml/2006/compatibility" xmlns:p14="http://schemas.microsoft.com/office/powerpoint/2010/main" xmlns:p15="http://schemas.microsoft.com/office/powerpoint/2012/main" xmlns:go="http://customooxmlschemas.google.com/" cellId="238:0:1"/>
                       </a:ext>
                     </a:extLst>
                   </a:tcPr>
@@ -22622,7 +22622,7 @@
                     </a:solidFill>
                     <a:extLst>
                       <a:ext uri="http://customooxmlschemas.google.com/">
-                        <go:slidesCustomData xmlns:go="http://customooxmlschemas.google.com/" xmlns:p15="http://schemas.microsoft.com/office/powerpoint/2012/main" xmlns:p14="http://schemas.microsoft.com/office/powerpoint/2010/main" xmlns:com="http://schemas.openxmlformats.org/drawingml/2006/compatibility" xmlns:pvml="urn:schemas-microsoft-com:office:powerpoint" xmlns:v="urn:schemas-microsoft-com:vml" xmlns:o="urn:schemas-microsoft-com:office:office" xmlns:dgm="http://schemas.openxmlformats.org/drawingml/2006/diagram" xmlns:c="http://schemas.openxmlformats.org/drawingml/2006/chart" xmlns:mv="urn:schemas-microsoft-com:mac:vml" xmlns:mc="http://schemas.openxmlformats.org/markup-compatibility/2006" xmlns="" cellId="238:0:2"/>
+                        <go:slidesCustomData xmlns="" xmlns:mc="http://schemas.openxmlformats.org/markup-compatibility/2006" xmlns:mv="urn:schemas-microsoft-com:mac:vml" xmlns:c="http://schemas.openxmlformats.org/drawingml/2006/chart" xmlns:dgm="http://schemas.openxmlformats.org/drawingml/2006/diagram" xmlns:o="urn:schemas-microsoft-com:office:office" xmlns:v="urn:schemas-microsoft-com:vml" xmlns:pvml="urn:schemas-microsoft-com:office:powerpoint" xmlns:com="http://schemas.openxmlformats.org/drawingml/2006/compatibility" xmlns:p14="http://schemas.microsoft.com/office/powerpoint/2010/main" xmlns:p15="http://schemas.microsoft.com/office/powerpoint/2012/main" xmlns:go="http://customooxmlschemas.google.com/" cellId="238:0:2"/>
                       </a:ext>
                     </a:extLst>
                   </a:tcPr>
@@ -22701,7 +22701,7 @@
                     </a:solidFill>
                     <a:extLst>
                       <a:ext uri="http://customooxmlschemas.google.com/">
-                        <go:slidesCustomData xmlns:go="http://customooxmlschemas.google.com/" xmlns:p15="http://schemas.microsoft.com/office/powerpoint/2012/main" xmlns:p14="http://schemas.microsoft.com/office/powerpoint/2010/main" xmlns:com="http://schemas.openxmlformats.org/drawingml/2006/compatibility" xmlns:pvml="urn:schemas-microsoft-com:office:powerpoint" xmlns:v="urn:schemas-microsoft-com:vml" xmlns:o="urn:schemas-microsoft-com:office:office" xmlns:dgm="http://schemas.openxmlformats.org/drawingml/2006/diagram" xmlns:c="http://schemas.openxmlformats.org/drawingml/2006/chart" xmlns:mv="urn:schemas-microsoft-com:mac:vml" xmlns:mc="http://schemas.openxmlformats.org/markup-compatibility/2006" xmlns="" cellId="238:0:3"/>
+                        <go:slidesCustomData xmlns="" xmlns:mc="http://schemas.openxmlformats.org/markup-compatibility/2006" xmlns:mv="urn:schemas-microsoft-com:mac:vml" xmlns:c="http://schemas.openxmlformats.org/drawingml/2006/chart" xmlns:dgm="http://schemas.openxmlformats.org/drawingml/2006/diagram" xmlns:o="urn:schemas-microsoft-com:office:office" xmlns:v="urn:schemas-microsoft-com:vml" xmlns:pvml="urn:schemas-microsoft-com:office:powerpoint" xmlns:com="http://schemas.openxmlformats.org/drawingml/2006/compatibility" xmlns:p14="http://schemas.microsoft.com/office/powerpoint/2010/main" xmlns:p15="http://schemas.microsoft.com/office/powerpoint/2012/main" xmlns:go="http://customooxmlschemas.google.com/" cellId="238:0:3"/>
                       </a:ext>
                     </a:extLst>
                   </a:tcPr>
@@ -22780,7 +22780,7 @@
                     </a:solidFill>
                     <a:extLst>
                       <a:ext uri="http://customooxmlschemas.google.com/">
-                        <go:slidesCustomData xmlns:go="http://customooxmlschemas.google.com/" xmlns:p15="http://schemas.microsoft.com/office/powerpoint/2012/main" xmlns:p14="http://schemas.microsoft.com/office/powerpoint/2010/main" xmlns:com="http://schemas.openxmlformats.org/drawingml/2006/compatibility" xmlns:pvml="urn:schemas-microsoft-com:office:powerpoint" xmlns:v="urn:schemas-microsoft-com:vml" xmlns:o="urn:schemas-microsoft-com:office:office" xmlns:dgm="http://schemas.openxmlformats.org/drawingml/2006/diagram" xmlns:c="http://schemas.openxmlformats.org/drawingml/2006/chart" xmlns:mv="urn:schemas-microsoft-com:mac:vml" xmlns:mc="http://schemas.openxmlformats.org/markup-compatibility/2006" xmlns="" cellId="238:0:4"/>
+                        <go:slidesCustomData xmlns="" xmlns:mc="http://schemas.openxmlformats.org/markup-compatibility/2006" xmlns:mv="urn:schemas-microsoft-com:mac:vml" xmlns:c="http://schemas.openxmlformats.org/drawingml/2006/chart" xmlns:dgm="http://schemas.openxmlformats.org/drawingml/2006/diagram" xmlns:o="urn:schemas-microsoft-com:office:office" xmlns:v="urn:schemas-microsoft-com:vml" xmlns:pvml="urn:schemas-microsoft-com:office:powerpoint" xmlns:com="http://schemas.openxmlformats.org/drawingml/2006/compatibility" xmlns:p14="http://schemas.microsoft.com/office/powerpoint/2010/main" xmlns:p15="http://schemas.microsoft.com/office/powerpoint/2012/main" xmlns:go="http://customooxmlschemas.google.com/" cellId="238:0:4"/>
                       </a:ext>
                     </a:extLst>
                   </a:tcPr>
@@ -22866,7 +22866,7 @@
                     </a:solidFill>
                     <a:extLst>
                       <a:ext uri="http://customooxmlschemas.google.com/">
-                        <go:slidesCustomData xmlns:go="http://customooxmlschemas.google.com/" xmlns:p15="http://schemas.microsoft.com/office/powerpoint/2012/main" xmlns:p14="http://schemas.microsoft.com/office/powerpoint/2010/main" xmlns:com="http://schemas.openxmlformats.org/drawingml/2006/compatibility" xmlns:pvml="urn:schemas-microsoft-com:office:powerpoint" xmlns:v="urn:schemas-microsoft-com:vml" xmlns:o="urn:schemas-microsoft-com:office:office" xmlns:dgm="http://schemas.openxmlformats.org/drawingml/2006/diagram" xmlns:c="http://schemas.openxmlformats.org/drawingml/2006/chart" xmlns:mv="urn:schemas-microsoft-com:mac:vml" xmlns:mc="http://schemas.openxmlformats.org/markup-compatibility/2006" xmlns="" cellId="238:1:0"/>
+                        <go:slidesCustomData xmlns="" xmlns:mc="http://schemas.openxmlformats.org/markup-compatibility/2006" xmlns:mv="urn:schemas-microsoft-com:mac:vml" xmlns:c="http://schemas.openxmlformats.org/drawingml/2006/chart" xmlns:dgm="http://schemas.openxmlformats.org/drawingml/2006/diagram" xmlns:o="urn:schemas-microsoft-com:office:office" xmlns:v="urn:schemas-microsoft-com:vml" xmlns:pvml="urn:schemas-microsoft-com:office:powerpoint" xmlns:com="http://schemas.openxmlformats.org/drawingml/2006/compatibility" xmlns:p14="http://schemas.microsoft.com/office/powerpoint/2010/main" xmlns:p15="http://schemas.microsoft.com/office/powerpoint/2012/main" xmlns:go="http://customooxmlschemas.google.com/" cellId="238:1:0"/>
                       </a:ext>
                     </a:extLst>
                   </a:tcPr>
@@ -22945,7 +22945,7 @@
                     </a:solidFill>
                     <a:extLst>
                       <a:ext uri="http://customooxmlschemas.google.com/">
-                        <go:slidesCustomData xmlns:go="http://customooxmlschemas.google.com/" xmlns:p15="http://schemas.microsoft.com/office/powerpoint/2012/main" xmlns:p14="http://schemas.microsoft.com/office/powerpoint/2010/main" xmlns:com="http://schemas.openxmlformats.org/drawingml/2006/compatibility" xmlns:pvml="urn:schemas-microsoft-com:office:powerpoint" xmlns:v="urn:schemas-microsoft-com:vml" xmlns:o="urn:schemas-microsoft-com:office:office" xmlns:dgm="http://schemas.openxmlformats.org/drawingml/2006/diagram" xmlns:c="http://schemas.openxmlformats.org/drawingml/2006/chart" xmlns:mv="urn:schemas-microsoft-com:mac:vml" xmlns:mc="http://schemas.openxmlformats.org/markup-compatibility/2006" xmlns="" cellId="238:1:1"/>
+                        <go:slidesCustomData xmlns="" xmlns:mc="http://schemas.openxmlformats.org/markup-compatibility/2006" xmlns:mv="urn:schemas-microsoft-com:mac:vml" xmlns:c="http://schemas.openxmlformats.org/drawingml/2006/chart" xmlns:dgm="http://schemas.openxmlformats.org/drawingml/2006/diagram" xmlns:o="urn:schemas-microsoft-com:office:office" xmlns:v="urn:schemas-microsoft-com:vml" xmlns:pvml="urn:schemas-microsoft-com:office:powerpoint" xmlns:com="http://schemas.openxmlformats.org/drawingml/2006/compatibility" xmlns:p14="http://schemas.microsoft.com/office/powerpoint/2010/main" xmlns:p15="http://schemas.microsoft.com/office/powerpoint/2012/main" xmlns:go="http://customooxmlschemas.google.com/" cellId="238:1:1"/>
                       </a:ext>
                     </a:extLst>
                   </a:tcPr>
@@ -23024,7 +23024,7 @@
                     </a:solidFill>
                     <a:extLst>
                       <a:ext uri="http://customooxmlschemas.google.com/">
-                        <go:slidesCustomData xmlns:go="http://customooxmlschemas.google.com/" xmlns:p15="http://schemas.microsoft.com/office/powerpoint/2012/main" xmlns:p14="http://schemas.microsoft.com/office/powerpoint/2010/main" xmlns:com="http://schemas.openxmlformats.org/drawingml/2006/compatibility" xmlns:pvml="urn:schemas-microsoft-com:office:powerpoint" xmlns:v="urn:schemas-microsoft-com:vml" xmlns:o="urn:schemas-microsoft-com:office:office" xmlns:dgm="http://schemas.openxmlformats.org/drawingml/2006/diagram" xmlns:c="http://schemas.openxmlformats.org/drawingml/2006/chart" xmlns:mv="urn:schemas-microsoft-com:mac:vml" xmlns:mc="http://schemas.openxmlformats.org/markup-compatibility/2006" xmlns="" cellId="238:1:2"/>
+                        <go:slidesCustomData xmlns="" xmlns:mc="http://schemas.openxmlformats.org/markup-compatibility/2006" xmlns:mv="urn:schemas-microsoft-com:mac:vml" xmlns:c="http://schemas.openxmlformats.org/drawingml/2006/chart" xmlns:dgm="http://schemas.openxmlformats.org/drawingml/2006/diagram" xmlns:o="urn:schemas-microsoft-com:office:office" xmlns:v="urn:schemas-microsoft-com:vml" xmlns:pvml="urn:schemas-microsoft-com:office:powerpoint" xmlns:com="http://schemas.openxmlformats.org/drawingml/2006/compatibility" xmlns:p14="http://schemas.microsoft.com/office/powerpoint/2010/main" xmlns:p15="http://schemas.microsoft.com/office/powerpoint/2012/main" xmlns:go="http://customooxmlschemas.google.com/" cellId="238:1:2"/>
                       </a:ext>
                     </a:extLst>
                   </a:tcPr>
@@ -23092,7 +23092,7 @@
                     </a:lnB>
                     <a:extLst>
                       <a:ext uri="http://customooxmlschemas.google.com/">
-                        <go:slidesCustomData xmlns:go="http://customooxmlschemas.google.com/" xmlns:p15="http://schemas.microsoft.com/office/powerpoint/2012/main" xmlns:p14="http://schemas.microsoft.com/office/powerpoint/2010/main" xmlns:com="http://schemas.openxmlformats.org/drawingml/2006/compatibility" xmlns:pvml="urn:schemas-microsoft-com:office:powerpoint" xmlns:v="urn:schemas-microsoft-com:vml" xmlns:o="urn:schemas-microsoft-com:office:office" xmlns:dgm="http://schemas.openxmlformats.org/drawingml/2006/diagram" xmlns:c="http://schemas.openxmlformats.org/drawingml/2006/chart" xmlns:mv="urn:schemas-microsoft-com:mac:vml" xmlns:mc="http://schemas.openxmlformats.org/markup-compatibility/2006" xmlns="" cellId="238:1:3"/>
+                        <go:slidesCustomData xmlns="" xmlns:mc="http://schemas.openxmlformats.org/markup-compatibility/2006" xmlns:mv="urn:schemas-microsoft-com:mac:vml" xmlns:c="http://schemas.openxmlformats.org/drawingml/2006/chart" xmlns:dgm="http://schemas.openxmlformats.org/drawingml/2006/diagram" xmlns:o="urn:schemas-microsoft-com:office:office" xmlns:v="urn:schemas-microsoft-com:vml" xmlns:pvml="urn:schemas-microsoft-com:office:powerpoint" xmlns:com="http://schemas.openxmlformats.org/drawingml/2006/compatibility" xmlns:p14="http://schemas.microsoft.com/office/powerpoint/2010/main" xmlns:p15="http://schemas.microsoft.com/office/powerpoint/2012/main" xmlns:go="http://customooxmlschemas.google.com/" cellId="238:1:3"/>
                       </a:ext>
                     </a:extLst>
                   </a:tcPr>
@@ -23160,7 +23160,7 @@
                     </a:lnB>
                     <a:extLst>
                       <a:ext uri="http://customooxmlschemas.google.com/">
-                        <go:slidesCustomData xmlns:go="http://customooxmlschemas.google.com/" xmlns:p15="http://schemas.microsoft.com/office/powerpoint/2012/main" xmlns:p14="http://schemas.microsoft.com/office/powerpoint/2010/main" xmlns:com="http://schemas.openxmlformats.org/drawingml/2006/compatibility" xmlns:pvml="urn:schemas-microsoft-com:office:powerpoint" xmlns:v="urn:schemas-microsoft-com:vml" xmlns:o="urn:schemas-microsoft-com:office:office" xmlns:dgm="http://schemas.openxmlformats.org/drawingml/2006/diagram" xmlns:c="http://schemas.openxmlformats.org/drawingml/2006/chart" xmlns:mv="urn:schemas-microsoft-com:mac:vml" xmlns:mc="http://schemas.openxmlformats.org/markup-compatibility/2006" xmlns="" cellId="238:1:4"/>
+                        <go:slidesCustomData xmlns="" xmlns:mc="http://schemas.openxmlformats.org/markup-compatibility/2006" xmlns:mv="urn:schemas-microsoft-com:mac:vml" xmlns:c="http://schemas.openxmlformats.org/drawingml/2006/chart" xmlns:dgm="http://schemas.openxmlformats.org/drawingml/2006/diagram" xmlns:o="urn:schemas-microsoft-com:office:office" xmlns:v="urn:schemas-microsoft-com:vml" xmlns:pvml="urn:schemas-microsoft-com:office:powerpoint" xmlns:com="http://schemas.openxmlformats.org/drawingml/2006/compatibility" xmlns:p14="http://schemas.microsoft.com/office/powerpoint/2010/main" xmlns:p15="http://schemas.microsoft.com/office/powerpoint/2012/main" xmlns:go="http://customooxmlschemas.google.com/" cellId="238:1:4"/>
                       </a:ext>
                     </a:extLst>
                   </a:tcPr>
@@ -23246,7 +23246,7 @@
                     </a:solidFill>
                     <a:extLst>
                       <a:ext uri="http://customooxmlschemas.google.com/">
-                        <go:slidesCustomData xmlns:go="http://customooxmlschemas.google.com/" xmlns:p15="http://schemas.microsoft.com/office/powerpoint/2012/main" xmlns:p14="http://schemas.microsoft.com/office/powerpoint/2010/main" xmlns:com="http://schemas.openxmlformats.org/drawingml/2006/compatibility" xmlns:pvml="urn:schemas-microsoft-com:office:powerpoint" xmlns:v="urn:schemas-microsoft-com:vml" xmlns:o="urn:schemas-microsoft-com:office:office" xmlns:dgm="http://schemas.openxmlformats.org/drawingml/2006/diagram" xmlns:c="http://schemas.openxmlformats.org/drawingml/2006/chart" xmlns:mv="urn:schemas-microsoft-com:mac:vml" xmlns:mc="http://schemas.openxmlformats.org/markup-compatibility/2006" xmlns="" cellId="238:2:0"/>
+                        <go:slidesCustomData xmlns="" xmlns:mc="http://schemas.openxmlformats.org/markup-compatibility/2006" xmlns:mv="urn:schemas-microsoft-com:mac:vml" xmlns:c="http://schemas.openxmlformats.org/drawingml/2006/chart" xmlns:dgm="http://schemas.openxmlformats.org/drawingml/2006/diagram" xmlns:o="urn:schemas-microsoft-com:office:office" xmlns:v="urn:schemas-microsoft-com:vml" xmlns:pvml="urn:schemas-microsoft-com:office:powerpoint" xmlns:com="http://schemas.openxmlformats.org/drawingml/2006/compatibility" xmlns:p14="http://schemas.microsoft.com/office/powerpoint/2010/main" xmlns:p15="http://schemas.microsoft.com/office/powerpoint/2012/main" xmlns:go="http://customooxmlschemas.google.com/" cellId="238:2:0"/>
                       </a:ext>
                     </a:extLst>
                   </a:tcPr>
@@ -23314,7 +23314,7 @@
                     </a:lnB>
                     <a:extLst>
                       <a:ext uri="http://customooxmlschemas.google.com/">
-                        <go:slidesCustomData xmlns:go="http://customooxmlschemas.google.com/" xmlns:p15="http://schemas.microsoft.com/office/powerpoint/2012/main" xmlns:p14="http://schemas.microsoft.com/office/powerpoint/2010/main" xmlns:com="http://schemas.openxmlformats.org/drawingml/2006/compatibility" xmlns:pvml="urn:schemas-microsoft-com:office:powerpoint" xmlns:v="urn:schemas-microsoft-com:vml" xmlns:o="urn:schemas-microsoft-com:office:office" xmlns:dgm="http://schemas.openxmlformats.org/drawingml/2006/diagram" xmlns:c="http://schemas.openxmlformats.org/drawingml/2006/chart" xmlns:mv="urn:schemas-microsoft-com:mac:vml" xmlns:mc="http://schemas.openxmlformats.org/markup-compatibility/2006" xmlns="" cellId="238:2:1"/>
+                        <go:slidesCustomData xmlns="" xmlns:mc="http://schemas.openxmlformats.org/markup-compatibility/2006" xmlns:mv="urn:schemas-microsoft-com:mac:vml" xmlns:c="http://schemas.openxmlformats.org/drawingml/2006/chart" xmlns:dgm="http://schemas.openxmlformats.org/drawingml/2006/diagram" xmlns:o="urn:schemas-microsoft-com:office:office" xmlns:v="urn:schemas-microsoft-com:vml" xmlns:pvml="urn:schemas-microsoft-com:office:powerpoint" xmlns:com="http://schemas.openxmlformats.org/drawingml/2006/compatibility" xmlns:p14="http://schemas.microsoft.com/office/powerpoint/2010/main" xmlns:p15="http://schemas.microsoft.com/office/powerpoint/2012/main" xmlns:go="http://customooxmlschemas.google.com/" cellId="238:2:1"/>
                       </a:ext>
                     </a:extLst>
                   </a:tcPr>
@@ -23382,7 +23382,7 @@
                     </a:lnB>
                     <a:extLst>
                       <a:ext uri="http://customooxmlschemas.google.com/">
-                        <go:slidesCustomData xmlns:go="http://customooxmlschemas.google.com/" xmlns:p15="http://schemas.microsoft.com/office/powerpoint/2012/main" xmlns:p14="http://schemas.microsoft.com/office/powerpoint/2010/main" xmlns:com="http://schemas.openxmlformats.org/drawingml/2006/compatibility" xmlns:pvml="urn:schemas-microsoft-com:office:powerpoint" xmlns:v="urn:schemas-microsoft-com:vml" xmlns:o="urn:schemas-microsoft-com:office:office" xmlns:dgm="http://schemas.openxmlformats.org/drawingml/2006/diagram" xmlns:c="http://schemas.openxmlformats.org/drawingml/2006/chart" xmlns:mv="urn:schemas-microsoft-com:mac:vml" xmlns:mc="http://schemas.openxmlformats.org/markup-compatibility/2006" xmlns="" cellId="238:2:2"/>
+                        <go:slidesCustomData xmlns="" xmlns:mc="http://schemas.openxmlformats.org/markup-compatibility/2006" xmlns:mv="urn:schemas-microsoft-com:mac:vml" xmlns:c="http://schemas.openxmlformats.org/drawingml/2006/chart" xmlns:dgm="http://schemas.openxmlformats.org/drawingml/2006/diagram" xmlns:o="urn:schemas-microsoft-com:office:office" xmlns:v="urn:schemas-microsoft-com:vml" xmlns:pvml="urn:schemas-microsoft-com:office:powerpoint" xmlns:com="http://schemas.openxmlformats.org/drawingml/2006/compatibility" xmlns:p14="http://schemas.microsoft.com/office/powerpoint/2010/main" xmlns:p15="http://schemas.microsoft.com/office/powerpoint/2012/main" xmlns:go="http://customooxmlschemas.google.com/" cellId="238:2:2"/>
                       </a:ext>
                     </a:extLst>
                   </a:tcPr>
@@ -23450,7 +23450,7 @@
                     </a:lnB>
                     <a:extLst>
                       <a:ext uri="http://customooxmlschemas.google.com/">
-                        <go:slidesCustomData xmlns:go="http://customooxmlschemas.google.com/" xmlns:p15="http://schemas.microsoft.com/office/powerpoint/2012/main" xmlns:p14="http://schemas.microsoft.com/office/powerpoint/2010/main" xmlns:com="http://schemas.openxmlformats.org/drawingml/2006/compatibility" xmlns:pvml="urn:schemas-microsoft-com:office:powerpoint" xmlns:v="urn:schemas-microsoft-com:vml" xmlns:o="urn:schemas-microsoft-com:office:office" xmlns:dgm="http://schemas.openxmlformats.org/drawingml/2006/diagram" xmlns:c="http://schemas.openxmlformats.org/drawingml/2006/chart" xmlns:mv="urn:schemas-microsoft-com:mac:vml" xmlns:mc="http://schemas.openxmlformats.org/markup-compatibility/2006" xmlns="" cellId="238:2:3"/>
+                        <go:slidesCustomData xmlns="" xmlns:mc="http://schemas.openxmlformats.org/markup-compatibility/2006" xmlns:mv="urn:schemas-microsoft-com:mac:vml" xmlns:c="http://schemas.openxmlformats.org/drawingml/2006/chart" xmlns:dgm="http://schemas.openxmlformats.org/drawingml/2006/diagram" xmlns:o="urn:schemas-microsoft-com:office:office" xmlns:v="urn:schemas-microsoft-com:vml" xmlns:pvml="urn:schemas-microsoft-com:office:powerpoint" xmlns:com="http://schemas.openxmlformats.org/drawingml/2006/compatibility" xmlns:p14="http://schemas.microsoft.com/office/powerpoint/2010/main" xmlns:p15="http://schemas.microsoft.com/office/powerpoint/2012/main" xmlns:go="http://customooxmlschemas.google.com/" cellId="238:2:3"/>
                       </a:ext>
                     </a:extLst>
                   </a:tcPr>
@@ -23518,7 +23518,7 @@
                     </a:lnB>
                     <a:extLst>
                       <a:ext uri="http://customooxmlschemas.google.com/">
-                        <go:slidesCustomData xmlns:go="http://customooxmlschemas.google.com/" xmlns:p15="http://schemas.microsoft.com/office/powerpoint/2012/main" xmlns:p14="http://schemas.microsoft.com/office/powerpoint/2010/main" xmlns:com="http://schemas.openxmlformats.org/drawingml/2006/compatibility" xmlns:pvml="urn:schemas-microsoft-com:office:powerpoint" xmlns:v="urn:schemas-microsoft-com:vml" xmlns:o="urn:schemas-microsoft-com:office:office" xmlns:dgm="http://schemas.openxmlformats.org/drawingml/2006/diagram" xmlns:c="http://schemas.openxmlformats.org/drawingml/2006/chart" xmlns:mv="urn:schemas-microsoft-com:mac:vml" xmlns:mc="http://schemas.openxmlformats.org/markup-compatibility/2006" xmlns="" cellId="238:2:4"/>
+                        <go:slidesCustomData xmlns="" xmlns:mc="http://schemas.openxmlformats.org/markup-compatibility/2006" xmlns:mv="urn:schemas-microsoft-com:mac:vml" xmlns:c="http://schemas.openxmlformats.org/drawingml/2006/chart" xmlns:dgm="http://schemas.openxmlformats.org/drawingml/2006/diagram" xmlns:o="urn:schemas-microsoft-com:office:office" xmlns:v="urn:schemas-microsoft-com:vml" xmlns:pvml="urn:schemas-microsoft-com:office:powerpoint" xmlns:com="http://schemas.openxmlformats.org/drawingml/2006/compatibility" xmlns:p14="http://schemas.microsoft.com/office/powerpoint/2010/main" xmlns:p15="http://schemas.microsoft.com/office/powerpoint/2012/main" xmlns:go="http://customooxmlschemas.google.com/" cellId="238:2:4"/>
                       </a:ext>
                     </a:extLst>
                   </a:tcPr>
@@ -23833,7 +23833,7 @@
               <a:rPr lang="zh-TW" sz="1800">
                 <a:extLst>
                   <a:ext uri="http://customooxmlschemas.google.com/">
-                    <go:slidesCustomData xmlns:go="http://customooxmlschemas.google.com/" xmlns:p15="http://schemas.microsoft.com/office/powerpoint/2012/main" xmlns:p14="http://schemas.microsoft.com/office/powerpoint/2010/main" xmlns:com="http://schemas.openxmlformats.org/drawingml/2006/compatibility" xmlns:pvml="urn:schemas-microsoft-com:office:powerpoint" xmlns:v="urn:schemas-microsoft-com:vml" xmlns:o="urn:schemas-microsoft-com:office:office" xmlns:dgm="http://schemas.openxmlformats.org/drawingml/2006/diagram" xmlns:c="http://schemas.openxmlformats.org/drawingml/2006/chart" xmlns:mv="urn:schemas-microsoft-com:mac:vml" xmlns:mc="http://schemas.openxmlformats.org/markup-compatibility/2006" xmlns="" textRoundtripDataId="0"/>
+                    <go:slidesCustomData xmlns="" xmlns:mc="http://schemas.openxmlformats.org/markup-compatibility/2006" xmlns:mv="urn:schemas-microsoft-com:mac:vml" xmlns:c="http://schemas.openxmlformats.org/drawingml/2006/chart" xmlns:dgm="http://schemas.openxmlformats.org/drawingml/2006/diagram" xmlns:o="urn:schemas-microsoft-com:office:office" xmlns:v="urn:schemas-microsoft-com:vml" xmlns:pvml="urn:schemas-microsoft-com:office:powerpoint" xmlns:com="http://schemas.openxmlformats.org/drawingml/2006/compatibility" xmlns:p14="http://schemas.microsoft.com/office/powerpoint/2010/main" xmlns:p15="http://schemas.microsoft.com/office/powerpoint/2012/main" xmlns:go="http://customooxmlschemas.google.com/" textRoundtripDataId="0"/>
                   </a:ext>
                 </a:extLst>
               </a:rPr>
@@ -24885,10 +24885,10 @@
               <a:buChar char="●"/>
             </a:pPr>
             <a:r>
-              <a:rPr lang="zh-TW" sz="1600"/>
-              <a:t>Compared to normal SGD, adaptive optimizers perform worse, because they chose sharper minimizers. </a:t>
+              <a:rPr lang="zh-TW" sz="1600" dirty="0"/>
+              <a:t>Higher sharpness causes less stability</a:t>
             </a:r>
-            <a:endParaRPr sz="1600"/>
+            <a:endParaRPr sz="1600" dirty="0"/>
           </a:p>
           <a:p>
             <a:pPr marL="457200" lvl="0" indent="-330200" algn="l" rtl="0">
@@ -24902,27 +24902,10 @@
               <a:buChar char="●"/>
             </a:pPr>
             <a:r>
-              <a:rPr lang="zh-TW" sz="1600"/>
-              <a:t>Higher sharpness causes less stability</a:t>
-            </a:r>
-            <a:endParaRPr sz="1600"/>
-          </a:p>
-          <a:p>
-            <a:pPr marL="457200" lvl="0" indent="-330200" algn="l" rtl="0">
-              <a:spcBef>
-                <a:spcPts val="0"/>
-              </a:spcBef>
-              <a:spcAft>
-                <a:spcPts val="0"/>
-              </a:spcAft>
-              <a:buSzPts val="1600"/>
-              <a:buChar char="●"/>
-            </a:pPr>
-            <a:r>
-              <a:rPr lang="zh-TW" sz="1600"/>
+              <a:rPr lang="zh-TW" sz="1600" dirty="0"/>
               <a:t>We see GD perform much better in the training accuracy but is only marginally better on the test accuracy.  </a:t>
             </a:r>
-            <a:endParaRPr sz="1600"/>
+            <a:endParaRPr sz="1600" dirty="0"/>
           </a:p>
           <a:p>
             <a:pPr marL="0" lvl="0" indent="0" algn="l" rtl="0">
@@ -24934,7 +24917,7 @@
               </a:spcAft>
               <a:buNone/>
             </a:pPr>
-            <a:endParaRPr sz="1600"/>
+            <a:endParaRPr sz="1600" dirty="0"/>
           </a:p>
           <a:p>
             <a:pPr marL="0" lvl="0" indent="0" algn="l" rtl="0">
@@ -24946,7 +24929,7 @@
               </a:spcAft>
               <a:buNone/>
             </a:pPr>
-            <a:endParaRPr/>
+            <a:endParaRPr dirty="0"/>
           </a:p>
         </p:txBody>
       </p:sp>
@@ -27206,7 +27189,7 @@
         </p:nvGraphicFramePr>
         <p:xfrm>
           <a:off x="227650" y="1501975"/>
-          <a:ext cx="3000000" cy="3000000"/>
+          <a:ext cx="8742800" cy="4589075"/>
         </p:xfrm>
         <a:graphic>
           <a:graphicData uri="http://schemas.openxmlformats.org/drawingml/2006/table">

</xml_diff>

<commit_message>
updated format of first slide/first code cell to match email
</commit_message>
<xml_diff>
--- a/code/skyhawks_presentation.pptx
+++ b/code/skyhawks_presentation.pptx
@@ -279,7 +279,7 @@
       </p15:sldGuideLst>
     </p:ext>
     <p:ext uri="http://customooxmlschemas.google.com/">
-      <go:slidesCustomData xmlns="" xmlns:mc="http://schemas.openxmlformats.org/markup-compatibility/2006" xmlns:mv="urn:schemas-microsoft-com:mac:vml" xmlns:c="http://schemas.openxmlformats.org/drawingml/2006/chart" xmlns:dgm="http://schemas.openxmlformats.org/drawingml/2006/diagram" xmlns:o="urn:schemas-microsoft-com:office:office" xmlns:v="urn:schemas-microsoft-com:vml" xmlns:pvml="urn:schemas-microsoft-com:office:powerpoint" xmlns:com="http://schemas.openxmlformats.org/drawingml/2006/compatibility" xmlns:p14="http://schemas.microsoft.com/office/powerpoint/2010/main" xmlns:p15="http://schemas.microsoft.com/office/powerpoint/2012/main" xmlns:go="http://customooxmlschemas.google.com/" r:id="rId30" roundtripDataSignature="AMtx7mhFn+gcyQ036oYda9UM3h3aHgNfCw=="/>
+      <go:slidesCustomData xmlns:go="http://customooxmlschemas.google.com/" xmlns:p15="http://schemas.microsoft.com/office/powerpoint/2012/main" xmlns:p14="http://schemas.microsoft.com/office/powerpoint/2010/main" xmlns:com="http://schemas.openxmlformats.org/drawingml/2006/compatibility" xmlns:pvml="urn:schemas-microsoft-com:office:powerpoint" xmlns:v="urn:schemas-microsoft-com:vml" xmlns:o="urn:schemas-microsoft-com:office:office" xmlns:dgm="http://schemas.openxmlformats.org/drawingml/2006/diagram" xmlns:c="http://schemas.openxmlformats.org/drawingml/2006/chart" xmlns:mv="urn:schemas-microsoft-com:mac:vml" xmlns:mc="http://schemas.openxmlformats.org/markup-compatibility/2006" xmlns="" r:id="rId30" roundtripDataSignature="AMtx7mhFn+gcyQ036oYda9UM3h3aHgNfCw=="/>
     </p:ext>
   </p:extLst>
 </p:presentation>
@@ -20087,7 +20087,7 @@
               <a:buNone/>
             </a:pPr>
             <a:r>
-              <a:rPr lang="zh-TW" sz="3600" b="0" i="0" u="none" strike="noStrike" cap="none">
+              <a:rPr lang="zh-TW" sz="3600" b="0" i="0" u="none" strike="noStrike" cap="none" dirty="0">
                 <a:solidFill>
                   <a:srgbClr val="4D4D4D"/>
                 </a:solidFill>
@@ -20099,7 +20099,7 @@
               <a:t>How SGD Selects the Global Minima in </a:t>
             </a:r>
             <a:br>
-              <a:rPr lang="zh-TW" sz="3600" b="0" i="0" u="none" strike="noStrike" cap="none">
+              <a:rPr lang="zh-TW" sz="3600" b="0" i="0" u="none" strike="noStrike" cap="none" dirty="0">
                 <a:solidFill>
                   <a:srgbClr val="4D4D4D"/>
                 </a:solidFill>
@@ -20110,7 +20110,7 @@
               </a:rPr>
             </a:br>
             <a:r>
-              <a:rPr lang="zh-TW" sz="3600" b="0" i="0" u="none" strike="noStrike" cap="none">
+              <a:rPr lang="zh-TW" sz="3600" b="0" i="0" u="none" strike="noStrike" cap="none" dirty="0">
                 <a:solidFill>
                   <a:srgbClr val="4D4D4D"/>
                 </a:solidFill>
@@ -20121,7 +20121,7 @@
               </a:rPr>
               <a:t>Over-parameterized Learning:</a:t>
             </a:r>
-            <a:endParaRPr sz="3600" b="0" i="0" u="none" strike="noStrike" cap="none">
+            <a:endParaRPr sz="3600" b="0" i="0" u="none" strike="noStrike" cap="none" dirty="0">
               <a:solidFill>
                 <a:srgbClr val="4D4D4D"/>
               </a:solidFill>
@@ -20150,7 +20150,7 @@
               <a:buNone/>
             </a:pPr>
             <a:r>
-              <a:rPr lang="zh-TW" sz="3600" b="0" i="0" u="none" strike="noStrike" cap="none">
+              <a:rPr lang="zh-TW" sz="3600" b="0" i="0" u="none" strike="noStrike" cap="none" dirty="0">
                 <a:solidFill>
                   <a:srgbClr val="4D4D4D"/>
                 </a:solidFill>
@@ -20161,7 +20161,7 @@
               </a:rPr>
               <a:t>A Dynamical Stability Perspective</a:t>
             </a:r>
-            <a:endParaRPr sz="3600" b="0" i="0" u="none" strike="noStrike" cap="none">
+            <a:endParaRPr sz="3600" b="0" i="0" u="none" strike="noStrike" cap="none" dirty="0">
               <a:solidFill>
                 <a:srgbClr val="4D4D4D"/>
               </a:solidFill>
@@ -20190,7 +20190,7 @@
               <a:buNone/>
             </a:pPr>
             <a:r>
-              <a:rPr lang="zh-TW" sz="1800" b="0" i="0" u="none" strike="noStrike" cap="none">
+              <a:rPr lang="zh-TW" sz="1800" b="0" i="0" u="none" strike="noStrike" cap="none" dirty="0">
                 <a:solidFill>
                   <a:srgbClr val="4D4D4D"/>
                 </a:solidFill>
@@ -20201,7 +20201,7 @@
               </a:rPr>
               <a:t>by Lei Wu, Chao Ma, Weinan E</a:t>
             </a:r>
-            <a:endParaRPr sz="1800" b="0" i="0" u="none" strike="noStrike" cap="none">
+            <a:endParaRPr sz="1800" b="0" i="0" u="none" strike="noStrike" cap="none" dirty="0">
               <a:solidFill>
                 <a:srgbClr val="4D4D4D"/>
               </a:solidFill>
@@ -20229,7 +20229,7 @@
               <a:buFont typeface="Arial"/>
               <a:buNone/>
             </a:pPr>
-            <a:endParaRPr sz="3600" b="0" i="0" u="none" strike="noStrike" cap="none">
+            <a:endParaRPr sz="3600" b="0" i="0" u="none" strike="noStrike" cap="none" dirty="0">
               <a:solidFill>
                 <a:srgbClr val="4D4D4D"/>
               </a:solidFill>
@@ -20257,7 +20257,7 @@
               <a:buFont typeface="Arial"/>
               <a:buNone/>
             </a:pPr>
-            <a:endParaRPr sz="3600" b="0" i="0" u="none" strike="noStrike" cap="none">
+            <a:endParaRPr sz="3600" b="0" i="0" u="none" strike="noStrike" cap="none" dirty="0">
               <a:solidFill>
                 <a:srgbClr val="4D4D4D"/>
               </a:solidFill>
@@ -20277,8 +20277,8 @@
         </p:nvSpPr>
         <p:spPr>
           <a:xfrm>
-            <a:off x="4297450" y="4411925"/>
-            <a:ext cx="4512300" cy="1342800"/>
+            <a:off x="411850" y="5966625"/>
+            <a:ext cx="2028548" cy="337353"/>
           </a:xfrm>
           <a:prstGeom prst="rect">
             <a:avLst/>
@@ -20312,7 +20312,7 @@
               <a:buNone/>
             </a:pPr>
             <a:r>
-              <a:rPr lang="zh-TW" sz="2400">
+              <a:rPr lang="zh-TW" sz="1800" dirty="0">
                 <a:latin typeface="Georgia"/>
                 <a:ea typeface="Georgia"/>
                 <a:cs typeface="Georgia"/>
@@ -20320,7 +20320,7 @@
               </a:rPr>
               <a:t>Team:  Skyhawks</a:t>
             </a:r>
-            <a:endParaRPr sz="2400">
+            <a:endParaRPr sz="1800" dirty="0">
               <a:latin typeface="Georgia"/>
               <a:ea typeface="Georgia"/>
               <a:cs typeface="Georgia"/>
@@ -20345,7 +20345,7 @@
               <a:buFont typeface="Arial"/>
               <a:buNone/>
             </a:pPr>
-            <a:endParaRPr sz="2400">
+            <a:endParaRPr sz="2400" dirty="0">
               <a:latin typeface="Georgia"/>
               <a:ea typeface="Georgia"/>
               <a:cs typeface="Georgia"/>
@@ -20355,102 +20355,22 @@
           <a:p>
             <a:pPr marL="0" marR="0" lvl="0" indent="0" algn="l" rtl="0">
               <a:lnSpc>
-                <a:spcPct val="115000"/>
-              </a:lnSpc>
-              <a:spcBef>
-                <a:spcPts val="0"/>
-              </a:spcBef>
-              <a:spcAft>
-                <a:spcPts val="0"/>
-              </a:spcAft>
-              <a:buClr>
-                <a:schemeClr val="dk1"/>
-              </a:buClr>
-              <a:buSzPts val="1100"/>
+                <a:spcPct val="100000"/>
+              </a:lnSpc>
+              <a:spcBef>
+                <a:spcPts val="0"/>
+              </a:spcBef>
+              <a:spcAft>
+                <a:spcPts val="0"/>
+              </a:spcAft>
+              <a:buClr>
+                <a:srgbClr val="000000"/>
+              </a:buClr>
+              <a:buSzPts val="1400"/>
               <a:buFont typeface="Arial"/>
               <a:buNone/>
             </a:pPr>
-            <a:r>
-              <a:rPr lang="zh-TW" sz="2400" b="0" i="0" u="none" strike="noStrike" cap="none">
-                <a:solidFill>
-                  <a:srgbClr val="000000"/>
-                </a:solidFill>
-                <a:latin typeface="Georgia"/>
-                <a:ea typeface="Georgia"/>
-                <a:cs typeface="Georgia"/>
-                <a:sym typeface="Georgia"/>
-              </a:rPr>
-              <a:t>Patrick Myers, Gaurav Jindal</a:t>
-            </a:r>
-            <a:endParaRPr sz="2400" b="0" i="0" u="none" strike="noStrike" cap="none">
-              <a:solidFill>
-                <a:srgbClr val="000000"/>
-              </a:solidFill>
-              <a:latin typeface="Georgia"/>
-              <a:ea typeface="Georgia"/>
-              <a:cs typeface="Georgia"/>
-              <a:sym typeface="Georgia"/>
-            </a:endParaRPr>
-          </a:p>
-          <a:p>
-            <a:pPr marL="0" marR="0" lvl="0" indent="0" algn="l" rtl="0">
-              <a:lnSpc>
-                <a:spcPct val="115000"/>
-              </a:lnSpc>
-              <a:spcBef>
-                <a:spcPts val="0"/>
-              </a:spcBef>
-              <a:spcAft>
-                <a:spcPts val="0"/>
-              </a:spcAft>
-              <a:buClr>
-                <a:schemeClr val="dk1"/>
-              </a:buClr>
-              <a:buSzPts val="1100"/>
-              <a:buFont typeface="Arial"/>
-              <a:buNone/>
-            </a:pPr>
-            <a:r>
-              <a:rPr lang="zh-TW" sz="2400" b="0" i="0" u="none" strike="noStrike" cap="none">
-                <a:solidFill>
-                  <a:srgbClr val="000000"/>
-                </a:solidFill>
-                <a:latin typeface="Georgia"/>
-                <a:ea typeface="Georgia"/>
-                <a:cs typeface="Georgia"/>
-                <a:sym typeface="Georgia"/>
-              </a:rPr>
-              <a:t>Rishab Bamrara, Phillip Seaton</a:t>
-            </a:r>
-            <a:endParaRPr sz="2400" b="0" i="0" u="none" strike="noStrike" cap="none">
-              <a:solidFill>
-                <a:srgbClr val="000000"/>
-              </a:solidFill>
-              <a:latin typeface="Georgia"/>
-              <a:ea typeface="Georgia"/>
-              <a:cs typeface="Georgia"/>
-              <a:sym typeface="Georgia"/>
-            </a:endParaRPr>
-          </a:p>
-          <a:p>
-            <a:pPr marL="0" marR="0" lvl="0" indent="0" algn="l" rtl="0">
-              <a:lnSpc>
-                <a:spcPct val="100000"/>
-              </a:lnSpc>
-              <a:spcBef>
-                <a:spcPts val="0"/>
-              </a:spcBef>
-              <a:spcAft>
-                <a:spcPts val="0"/>
-              </a:spcAft>
-              <a:buClr>
-                <a:srgbClr val="000000"/>
-              </a:buClr>
-              <a:buSzPts val="1400"/>
-              <a:buFont typeface="Arial"/>
-              <a:buNone/>
-            </a:pPr>
-            <a:endParaRPr sz="1400" b="0" i="0" u="none" strike="noStrike" cap="none">
+            <a:endParaRPr sz="1400" b="0" i="0" u="none" strike="noStrike" cap="none" dirty="0">
               <a:solidFill>
                 <a:srgbClr val="000000"/>
               </a:solidFill>
@@ -20470,7 +20390,7 @@
         </p:nvSpPr>
         <p:spPr>
           <a:xfrm>
-            <a:off x="555100" y="4519325"/>
+            <a:off x="457200" y="4521123"/>
             <a:ext cx="2972400" cy="1128000"/>
           </a:xfrm>
           <a:prstGeom prst="rect">
@@ -20505,7 +20425,7 @@
               <a:buNone/>
             </a:pPr>
             <a:r>
-              <a:rPr lang="zh-TW" sz="2400">
+              <a:rPr lang="zh-TW" sz="2400" dirty="0">
                 <a:latin typeface="Georgia"/>
                 <a:ea typeface="Georgia"/>
                 <a:cs typeface="Georgia"/>
@@ -20514,7 +20434,7 @@
               <a:t>Dec</a:t>
             </a:r>
             <a:r>
-              <a:rPr lang="zh-TW" sz="2400" b="0" i="0" u="none" strike="noStrike" cap="none">
+              <a:rPr lang="zh-TW" sz="2400" b="0" i="0" u="none" strike="noStrike" cap="none" dirty="0">
                 <a:solidFill>
                   <a:srgbClr val="000000"/>
                 </a:solidFill>
@@ -20526,7 +20446,7 @@
               <a:t> </a:t>
             </a:r>
             <a:r>
-              <a:rPr lang="zh-TW" sz="2400">
+              <a:rPr lang="zh-TW" sz="2400" dirty="0">
                 <a:latin typeface="Georgia"/>
                 <a:ea typeface="Georgia"/>
                 <a:cs typeface="Georgia"/>
@@ -20535,7 +20455,7 @@
               <a:t>6</a:t>
             </a:r>
             <a:r>
-              <a:rPr lang="zh-TW" sz="2400" b="0" i="0" u="none" strike="noStrike" cap="none">
+              <a:rPr lang="zh-TW" sz="2400" b="0" i="0" u="none" strike="noStrike" cap="none" dirty="0">
                 <a:solidFill>
                   <a:srgbClr val="000000"/>
                 </a:solidFill>
@@ -20546,7 +20466,7 @@
               </a:rPr>
               <a:t>, 2019</a:t>
             </a:r>
-            <a:endParaRPr sz="2400" b="0" i="0" u="none" strike="noStrike" cap="none">
+            <a:endParaRPr sz="2400" b="0" i="0" u="none" strike="noStrike" cap="none" dirty="0">
               <a:solidFill>
                 <a:srgbClr val="000000"/>
               </a:solidFill>
@@ -20555,6 +20475,100 @@
               <a:cs typeface="Georgia"/>
               <a:sym typeface="Georgia"/>
             </a:endParaRPr>
+          </a:p>
+        </p:txBody>
+      </p:sp>
+      <p:sp>
+        <p:nvSpPr>
+          <p:cNvPr id="2" name="TextBox 1">
+            <a:extLst>
+              <a:ext uri="{FF2B5EF4-FFF2-40B4-BE49-F238E27FC236}">
+                <a16:creationId xmlns:a16="http://schemas.microsoft.com/office/drawing/2014/main" id="{13F5FCF8-BA12-4C1B-8051-EA2C226BB91A}"/>
+              </a:ext>
+            </a:extLst>
+          </p:cNvPr>
+          <p:cNvSpPr txBox="1"/>
+          <p:nvPr/>
+        </p:nvSpPr>
+        <p:spPr>
+          <a:xfrm>
+            <a:off x="411850" y="5459250"/>
+            <a:ext cx="8274950" cy="626325"/>
+          </a:xfrm>
+          <a:prstGeom prst="rect">
+            <a:avLst/>
+          </a:prstGeom>
+          <a:noFill/>
+        </p:spPr>
+        <p:txBody>
+          <a:bodyPr wrap="square" rtlCol="0">
+            <a:spAutoFit/>
+          </a:bodyPr>
+          <a:lstStyle/>
+          <a:p>
+            <a:pPr lvl="0">
+              <a:lnSpc>
+                <a:spcPct val="115000"/>
+              </a:lnSpc>
+              <a:buClr>
+                <a:schemeClr val="dk1"/>
+              </a:buClr>
+              <a:buSzPts val="1100"/>
+            </a:pPr>
+            <a:r>
+              <a:rPr lang="en-US" altLang="zh-TW" sz="1800" dirty="0">
+                <a:latin typeface="Georgia"/>
+                <a:ea typeface="Georgia"/>
+                <a:cs typeface="Georgia"/>
+                <a:sym typeface="Georgia"/>
+              </a:rPr>
+              <a:t>Reproduced By:  Patrick Myers, Gaurav Jindal, </a:t>
+            </a:r>
+            <a:r>
+              <a:rPr lang="en-US" altLang="zh-TW" sz="1800" dirty="0" err="1">
+                <a:latin typeface="Georgia"/>
+                <a:ea typeface="Georgia"/>
+                <a:cs typeface="Georgia"/>
+                <a:sym typeface="Georgia"/>
+              </a:rPr>
+              <a:t>Rishab</a:t>
+            </a:r>
+            <a:r>
+              <a:rPr lang="en-US" altLang="zh-TW" sz="1800" dirty="0">
+                <a:latin typeface="Georgia"/>
+                <a:ea typeface="Georgia"/>
+                <a:cs typeface="Georgia"/>
+                <a:sym typeface="Georgia"/>
+              </a:rPr>
+              <a:t> </a:t>
+            </a:r>
+            <a:r>
+              <a:rPr lang="en-US" altLang="zh-TW" sz="1800" dirty="0" err="1">
+                <a:latin typeface="Georgia"/>
+                <a:ea typeface="Georgia"/>
+                <a:cs typeface="Georgia"/>
+                <a:sym typeface="Georgia"/>
+              </a:rPr>
+              <a:t>Bamrara</a:t>
+            </a:r>
+            <a:r>
+              <a:rPr lang="en-US" altLang="zh-TW" sz="1800" dirty="0">
+                <a:latin typeface="Georgia"/>
+                <a:ea typeface="Georgia"/>
+                <a:cs typeface="Georgia"/>
+                <a:sym typeface="Georgia"/>
+              </a:rPr>
+              <a:t>, Phillip Seaton</a:t>
+            </a:r>
+            <a:endParaRPr lang="en-US" sz="1800" dirty="0">
+              <a:latin typeface="Georgia"/>
+              <a:ea typeface="Georgia"/>
+              <a:cs typeface="Georgia"/>
+              <a:sym typeface="Georgia"/>
+            </a:endParaRPr>
+          </a:p>
+          <a:p>
+            <a:endParaRPr lang="en-US" dirty="0"/>
           </a:p>
         </p:txBody>
       </p:sp>
@@ -22464,7 +22478,7 @@
                     </a:lnB>
                     <a:extLst>
                       <a:ext uri="http://customooxmlschemas.google.com/">
-                        <go:slidesCustomData xmlns="" xmlns:mc="http://schemas.openxmlformats.org/markup-compatibility/2006" xmlns:mv="urn:schemas-microsoft-com:mac:vml" xmlns:c="http://schemas.openxmlformats.org/drawingml/2006/chart" xmlns:dgm="http://schemas.openxmlformats.org/drawingml/2006/diagram" xmlns:o="urn:schemas-microsoft-com:office:office" xmlns:v="urn:schemas-microsoft-com:vml" xmlns:pvml="urn:schemas-microsoft-com:office:powerpoint" xmlns:com="http://schemas.openxmlformats.org/drawingml/2006/compatibility" xmlns:p14="http://schemas.microsoft.com/office/powerpoint/2010/main" xmlns:p15="http://schemas.microsoft.com/office/powerpoint/2012/main" xmlns:go="http://customooxmlschemas.google.com/" cellId="238:0:0"/>
+                        <go:slidesCustomData xmlns:go="http://customooxmlschemas.google.com/" xmlns:p15="http://schemas.microsoft.com/office/powerpoint/2012/main" xmlns:p14="http://schemas.microsoft.com/office/powerpoint/2010/main" xmlns:com="http://schemas.openxmlformats.org/drawingml/2006/compatibility" xmlns:pvml="urn:schemas-microsoft-com:office:powerpoint" xmlns:v="urn:schemas-microsoft-com:vml" xmlns:o="urn:schemas-microsoft-com:office:office" xmlns:dgm="http://schemas.openxmlformats.org/drawingml/2006/diagram" xmlns:c="http://schemas.openxmlformats.org/drawingml/2006/chart" xmlns:mv="urn:schemas-microsoft-com:mac:vml" xmlns:mc="http://schemas.openxmlformats.org/markup-compatibility/2006" xmlns="" cellId="238:0:0"/>
                       </a:ext>
                     </a:extLst>
                   </a:tcPr>
@@ -22543,7 +22557,7 @@
                     </a:solidFill>
                     <a:extLst>
                       <a:ext uri="http://customooxmlschemas.google.com/">
-                        <go:slidesCustomData xmlns="" xmlns:mc="http://schemas.openxmlformats.org/markup-compatibility/2006" xmlns:mv="urn:schemas-microsoft-com:mac:vml" xmlns:c="http://schemas.openxmlformats.org/drawingml/2006/chart" xmlns:dgm="http://schemas.openxmlformats.org/drawingml/2006/diagram" xmlns:o="urn:schemas-microsoft-com:office:office" xmlns:v="urn:schemas-microsoft-com:vml" xmlns:pvml="urn:schemas-microsoft-com:office:powerpoint" xmlns:com="http://schemas.openxmlformats.org/drawingml/2006/compatibility" xmlns:p14="http://schemas.microsoft.com/office/powerpoint/2010/main" xmlns:p15="http://schemas.microsoft.com/office/powerpoint/2012/main" xmlns:go="http://customooxmlschemas.google.com/" cellId="238:0:1"/>
+                        <go:slidesCustomData xmlns:go="http://customooxmlschemas.google.com/" xmlns:p15="http://schemas.microsoft.com/office/powerpoint/2012/main" xmlns:p14="http://schemas.microsoft.com/office/powerpoint/2010/main" xmlns:com="http://schemas.openxmlformats.org/drawingml/2006/compatibility" xmlns:pvml="urn:schemas-microsoft-com:office:powerpoint" xmlns:v="urn:schemas-microsoft-com:vml" xmlns:o="urn:schemas-microsoft-com:office:office" xmlns:dgm="http://schemas.openxmlformats.org/drawingml/2006/diagram" xmlns:c="http://schemas.openxmlformats.org/drawingml/2006/chart" xmlns:mv="urn:schemas-microsoft-com:mac:vml" xmlns:mc="http://schemas.openxmlformats.org/markup-compatibility/2006" xmlns="" cellId="238:0:1"/>
                       </a:ext>
                     </a:extLst>
                   </a:tcPr>
@@ -22622,7 +22636,7 @@
                     </a:solidFill>
                     <a:extLst>
                       <a:ext uri="http://customooxmlschemas.google.com/">
-                        <go:slidesCustomData xmlns="" xmlns:mc="http://schemas.openxmlformats.org/markup-compatibility/2006" xmlns:mv="urn:schemas-microsoft-com:mac:vml" xmlns:c="http://schemas.openxmlformats.org/drawingml/2006/chart" xmlns:dgm="http://schemas.openxmlformats.org/drawingml/2006/diagram" xmlns:o="urn:schemas-microsoft-com:office:office" xmlns:v="urn:schemas-microsoft-com:vml" xmlns:pvml="urn:schemas-microsoft-com:office:powerpoint" xmlns:com="http://schemas.openxmlformats.org/drawingml/2006/compatibility" xmlns:p14="http://schemas.microsoft.com/office/powerpoint/2010/main" xmlns:p15="http://schemas.microsoft.com/office/powerpoint/2012/main" xmlns:go="http://customooxmlschemas.google.com/" cellId="238:0:2"/>
+                        <go:slidesCustomData xmlns:go="http://customooxmlschemas.google.com/" xmlns:p15="http://schemas.microsoft.com/office/powerpoint/2012/main" xmlns:p14="http://schemas.microsoft.com/office/powerpoint/2010/main" xmlns:com="http://schemas.openxmlformats.org/drawingml/2006/compatibility" xmlns:pvml="urn:schemas-microsoft-com:office:powerpoint" xmlns:v="urn:schemas-microsoft-com:vml" xmlns:o="urn:schemas-microsoft-com:office:office" xmlns:dgm="http://schemas.openxmlformats.org/drawingml/2006/diagram" xmlns:c="http://schemas.openxmlformats.org/drawingml/2006/chart" xmlns:mv="urn:schemas-microsoft-com:mac:vml" xmlns:mc="http://schemas.openxmlformats.org/markup-compatibility/2006" xmlns="" cellId="238:0:2"/>
                       </a:ext>
                     </a:extLst>
                   </a:tcPr>
@@ -22701,7 +22715,7 @@
                     </a:solidFill>
                     <a:extLst>
                       <a:ext uri="http://customooxmlschemas.google.com/">
-                        <go:slidesCustomData xmlns="" xmlns:mc="http://schemas.openxmlformats.org/markup-compatibility/2006" xmlns:mv="urn:schemas-microsoft-com:mac:vml" xmlns:c="http://schemas.openxmlformats.org/drawingml/2006/chart" xmlns:dgm="http://schemas.openxmlformats.org/drawingml/2006/diagram" xmlns:o="urn:schemas-microsoft-com:office:office" xmlns:v="urn:schemas-microsoft-com:vml" xmlns:pvml="urn:schemas-microsoft-com:office:powerpoint" xmlns:com="http://schemas.openxmlformats.org/drawingml/2006/compatibility" xmlns:p14="http://schemas.microsoft.com/office/powerpoint/2010/main" xmlns:p15="http://schemas.microsoft.com/office/powerpoint/2012/main" xmlns:go="http://customooxmlschemas.google.com/" cellId="238:0:3"/>
+                        <go:slidesCustomData xmlns:go="http://customooxmlschemas.google.com/" xmlns:p15="http://schemas.microsoft.com/office/powerpoint/2012/main" xmlns:p14="http://schemas.microsoft.com/office/powerpoint/2010/main" xmlns:com="http://schemas.openxmlformats.org/drawingml/2006/compatibility" xmlns:pvml="urn:schemas-microsoft-com:office:powerpoint" xmlns:v="urn:schemas-microsoft-com:vml" xmlns:o="urn:schemas-microsoft-com:office:office" xmlns:dgm="http://schemas.openxmlformats.org/drawingml/2006/diagram" xmlns:c="http://schemas.openxmlformats.org/drawingml/2006/chart" xmlns:mv="urn:schemas-microsoft-com:mac:vml" xmlns:mc="http://schemas.openxmlformats.org/markup-compatibility/2006" xmlns="" cellId="238:0:3"/>
                       </a:ext>
                     </a:extLst>
                   </a:tcPr>
@@ -22780,7 +22794,7 @@
                     </a:solidFill>
                     <a:extLst>
                       <a:ext uri="http://customooxmlschemas.google.com/">
-                        <go:slidesCustomData xmlns="" xmlns:mc="http://schemas.openxmlformats.org/markup-compatibility/2006" xmlns:mv="urn:schemas-microsoft-com:mac:vml" xmlns:c="http://schemas.openxmlformats.org/drawingml/2006/chart" xmlns:dgm="http://schemas.openxmlformats.org/drawingml/2006/diagram" xmlns:o="urn:schemas-microsoft-com:office:office" xmlns:v="urn:schemas-microsoft-com:vml" xmlns:pvml="urn:schemas-microsoft-com:office:powerpoint" xmlns:com="http://schemas.openxmlformats.org/drawingml/2006/compatibility" xmlns:p14="http://schemas.microsoft.com/office/powerpoint/2010/main" xmlns:p15="http://schemas.microsoft.com/office/powerpoint/2012/main" xmlns:go="http://customooxmlschemas.google.com/" cellId="238:0:4"/>
+                        <go:slidesCustomData xmlns:go="http://customooxmlschemas.google.com/" xmlns:p15="http://schemas.microsoft.com/office/powerpoint/2012/main" xmlns:p14="http://schemas.microsoft.com/office/powerpoint/2010/main" xmlns:com="http://schemas.openxmlformats.org/drawingml/2006/compatibility" xmlns:pvml="urn:schemas-microsoft-com:office:powerpoint" xmlns:v="urn:schemas-microsoft-com:vml" xmlns:o="urn:schemas-microsoft-com:office:office" xmlns:dgm="http://schemas.openxmlformats.org/drawingml/2006/diagram" xmlns:c="http://schemas.openxmlformats.org/drawingml/2006/chart" xmlns:mv="urn:schemas-microsoft-com:mac:vml" xmlns:mc="http://schemas.openxmlformats.org/markup-compatibility/2006" xmlns="" cellId="238:0:4"/>
                       </a:ext>
                     </a:extLst>
                   </a:tcPr>
@@ -22866,7 +22880,7 @@
                     </a:solidFill>
                     <a:extLst>
                       <a:ext uri="http://customooxmlschemas.google.com/">
-                        <go:slidesCustomData xmlns="" xmlns:mc="http://schemas.openxmlformats.org/markup-compatibility/2006" xmlns:mv="urn:schemas-microsoft-com:mac:vml" xmlns:c="http://schemas.openxmlformats.org/drawingml/2006/chart" xmlns:dgm="http://schemas.openxmlformats.org/drawingml/2006/diagram" xmlns:o="urn:schemas-microsoft-com:office:office" xmlns:v="urn:schemas-microsoft-com:vml" xmlns:pvml="urn:schemas-microsoft-com:office:powerpoint" xmlns:com="http://schemas.openxmlformats.org/drawingml/2006/compatibility" xmlns:p14="http://schemas.microsoft.com/office/powerpoint/2010/main" xmlns:p15="http://schemas.microsoft.com/office/powerpoint/2012/main" xmlns:go="http://customooxmlschemas.google.com/" cellId="238:1:0"/>
+                        <go:slidesCustomData xmlns:go="http://customooxmlschemas.google.com/" xmlns:p15="http://schemas.microsoft.com/office/powerpoint/2012/main" xmlns:p14="http://schemas.microsoft.com/office/powerpoint/2010/main" xmlns:com="http://schemas.openxmlformats.org/drawingml/2006/compatibility" xmlns:pvml="urn:schemas-microsoft-com:office:powerpoint" xmlns:v="urn:schemas-microsoft-com:vml" xmlns:o="urn:schemas-microsoft-com:office:office" xmlns:dgm="http://schemas.openxmlformats.org/drawingml/2006/diagram" xmlns:c="http://schemas.openxmlformats.org/drawingml/2006/chart" xmlns:mv="urn:schemas-microsoft-com:mac:vml" xmlns:mc="http://schemas.openxmlformats.org/markup-compatibility/2006" xmlns="" cellId="238:1:0"/>
                       </a:ext>
                     </a:extLst>
                   </a:tcPr>
@@ -22945,7 +22959,7 @@
                     </a:solidFill>
                     <a:extLst>
                       <a:ext uri="http://customooxmlschemas.google.com/">
-                        <go:slidesCustomData xmlns="" xmlns:mc="http://schemas.openxmlformats.org/markup-compatibility/2006" xmlns:mv="urn:schemas-microsoft-com:mac:vml" xmlns:c="http://schemas.openxmlformats.org/drawingml/2006/chart" xmlns:dgm="http://schemas.openxmlformats.org/drawingml/2006/diagram" xmlns:o="urn:schemas-microsoft-com:office:office" xmlns:v="urn:schemas-microsoft-com:vml" xmlns:pvml="urn:schemas-microsoft-com:office:powerpoint" xmlns:com="http://schemas.openxmlformats.org/drawingml/2006/compatibility" xmlns:p14="http://schemas.microsoft.com/office/powerpoint/2010/main" xmlns:p15="http://schemas.microsoft.com/office/powerpoint/2012/main" xmlns:go="http://customooxmlschemas.google.com/" cellId="238:1:1"/>
+                        <go:slidesCustomData xmlns:go="http://customooxmlschemas.google.com/" xmlns:p15="http://schemas.microsoft.com/office/powerpoint/2012/main" xmlns:p14="http://schemas.microsoft.com/office/powerpoint/2010/main" xmlns:com="http://schemas.openxmlformats.org/drawingml/2006/compatibility" xmlns:pvml="urn:schemas-microsoft-com:office:powerpoint" xmlns:v="urn:schemas-microsoft-com:vml" xmlns:o="urn:schemas-microsoft-com:office:office" xmlns:dgm="http://schemas.openxmlformats.org/drawingml/2006/diagram" xmlns:c="http://schemas.openxmlformats.org/drawingml/2006/chart" xmlns:mv="urn:schemas-microsoft-com:mac:vml" xmlns:mc="http://schemas.openxmlformats.org/markup-compatibility/2006" xmlns="" cellId="238:1:1"/>
                       </a:ext>
                     </a:extLst>
                   </a:tcPr>
@@ -23024,7 +23038,7 @@
                     </a:solidFill>
                     <a:extLst>
                       <a:ext uri="http://customooxmlschemas.google.com/">
-                        <go:slidesCustomData xmlns="" xmlns:mc="http://schemas.openxmlformats.org/markup-compatibility/2006" xmlns:mv="urn:schemas-microsoft-com:mac:vml" xmlns:c="http://schemas.openxmlformats.org/drawingml/2006/chart" xmlns:dgm="http://schemas.openxmlformats.org/drawingml/2006/diagram" xmlns:o="urn:schemas-microsoft-com:office:office" xmlns:v="urn:schemas-microsoft-com:vml" xmlns:pvml="urn:schemas-microsoft-com:office:powerpoint" xmlns:com="http://schemas.openxmlformats.org/drawingml/2006/compatibility" xmlns:p14="http://schemas.microsoft.com/office/powerpoint/2010/main" xmlns:p15="http://schemas.microsoft.com/office/powerpoint/2012/main" xmlns:go="http://customooxmlschemas.google.com/" cellId="238:1:2"/>
+                        <go:slidesCustomData xmlns:go="http://customooxmlschemas.google.com/" xmlns:p15="http://schemas.microsoft.com/office/powerpoint/2012/main" xmlns:p14="http://schemas.microsoft.com/office/powerpoint/2010/main" xmlns:com="http://schemas.openxmlformats.org/drawingml/2006/compatibility" xmlns:pvml="urn:schemas-microsoft-com:office:powerpoint" xmlns:v="urn:schemas-microsoft-com:vml" xmlns:o="urn:schemas-microsoft-com:office:office" xmlns:dgm="http://schemas.openxmlformats.org/drawingml/2006/diagram" xmlns:c="http://schemas.openxmlformats.org/drawingml/2006/chart" xmlns:mv="urn:schemas-microsoft-com:mac:vml" xmlns:mc="http://schemas.openxmlformats.org/markup-compatibility/2006" xmlns="" cellId="238:1:2"/>
                       </a:ext>
                     </a:extLst>
                   </a:tcPr>
@@ -23092,7 +23106,7 @@
                     </a:lnB>
                     <a:extLst>
                       <a:ext uri="http://customooxmlschemas.google.com/">
-                        <go:slidesCustomData xmlns="" xmlns:mc="http://schemas.openxmlformats.org/markup-compatibility/2006" xmlns:mv="urn:schemas-microsoft-com:mac:vml" xmlns:c="http://schemas.openxmlformats.org/drawingml/2006/chart" xmlns:dgm="http://schemas.openxmlformats.org/drawingml/2006/diagram" xmlns:o="urn:schemas-microsoft-com:office:office" xmlns:v="urn:schemas-microsoft-com:vml" xmlns:pvml="urn:schemas-microsoft-com:office:powerpoint" xmlns:com="http://schemas.openxmlformats.org/drawingml/2006/compatibility" xmlns:p14="http://schemas.microsoft.com/office/powerpoint/2010/main" xmlns:p15="http://schemas.microsoft.com/office/powerpoint/2012/main" xmlns:go="http://customooxmlschemas.google.com/" cellId="238:1:3"/>
+                        <go:slidesCustomData xmlns:go="http://customooxmlschemas.google.com/" xmlns:p15="http://schemas.microsoft.com/office/powerpoint/2012/main" xmlns:p14="http://schemas.microsoft.com/office/powerpoint/2010/main" xmlns:com="http://schemas.openxmlformats.org/drawingml/2006/compatibility" xmlns:pvml="urn:schemas-microsoft-com:office:powerpoint" xmlns:v="urn:schemas-microsoft-com:vml" xmlns:o="urn:schemas-microsoft-com:office:office" xmlns:dgm="http://schemas.openxmlformats.org/drawingml/2006/diagram" xmlns:c="http://schemas.openxmlformats.org/drawingml/2006/chart" xmlns:mv="urn:schemas-microsoft-com:mac:vml" xmlns:mc="http://schemas.openxmlformats.org/markup-compatibility/2006" xmlns="" cellId="238:1:3"/>
                       </a:ext>
                     </a:extLst>
                   </a:tcPr>
@@ -23160,7 +23174,7 @@
                     </a:lnB>
                     <a:extLst>
                       <a:ext uri="http://customooxmlschemas.google.com/">
-                        <go:slidesCustomData xmlns="" xmlns:mc="http://schemas.openxmlformats.org/markup-compatibility/2006" xmlns:mv="urn:schemas-microsoft-com:mac:vml" xmlns:c="http://schemas.openxmlformats.org/drawingml/2006/chart" xmlns:dgm="http://schemas.openxmlformats.org/drawingml/2006/diagram" xmlns:o="urn:schemas-microsoft-com:office:office" xmlns:v="urn:schemas-microsoft-com:vml" xmlns:pvml="urn:schemas-microsoft-com:office:powerpoint" xmlns:com="http://schemas.openxmlformats.org/drawingml/2006/compatibility" xmlns:p14="http://schemas.microsoft.com/office/powerpoint/2010/main" xmlns:p15="http://schemas.microsoft.com/office/powerpoint/2012/main" xmlns:go="http://customooxmlschemas.google.com/" cellId="238:1:4"/>
+                        <go:slidesCustomData xmlns:go="http://customooxmlschemas.google.com/" xmlns:p15="http://schemas.microsoft.com/office/powerpoint/2012/main" xmlns:p14="http://schemas.microsoft.com/office/powerpoint/2010/main" xmlns:com="http://schemas.openxmlformats.org/drawingml/2006/compatibility" xmlns:pvml="urn:schemas-microsoft-com:office:powerpoint" xmlns:v="urn:schemas-microsoft-com:vml" xmlns:o="urn:schemas-microsoft-com:office:office" xmlns:dgm="http://schemas.openxmlformats.org/drawingml/2006/diagram" xmlns:c="http://schemas.openxmlformats.org/drawingml/2006/chart" xmlns:mv="urn:schemas-microsoft-com:mac:vml" xmlns:mc="http://schemas.openxmlformats.org/markup-compatibility/2006" xmlns="" cellId="238:1:4"/>
                       </a:ext>
                     </a:extLst>
                   </a:tcPr>
@@ -23246,7 +23260,7 @@
                     </a:solidFill>
                     <a:extLst>
                       <a:ext uri="http://customooxmlschemas.google.com/">
-                        <go:slidesCustomData xmlns="" xmlns:mc="http://schemas.openxmlformats.org/markup-compatibility/2006" xmlns:mv="urn:schemas-microsoft-com:mac:vml" xmlns:c="http://schemas.openxmlformats.org/drawingml/2006/chart" xmlns:dgm="http://schemas.openxmlformats.org/drawingml/2006/diagram" xmlns:o="urn:schemas-microsoft-com:office:office" xmlns:v="urn:schemas-microsoft-com:vml" xmlns:pvml="urn:schemas-microsoft-com:office:powerpoint" xmlns:com="http://schemas.openxmlformats.org/drawingml/2006/compatibility" xmlns:p14="http://schemas.microsoft.com/office/powerpoint/2010/main" xmlns:p15="http://schemas.microsoft.com/office/powerpoint/2012/main" xmlns:go="http://customooxmlschemas.google.com/" cellId="238:2:0"/>
+                        <go:slidesCustomData xmlns:go="http://customooxmlschemas.google.com/" xmlns:p15="http://schemas.microsoft.com/office/powerpoint/2012/main" xmlns:p14="http://schemas.microsoft.com/office/powerpoint/2010/main" xmlns:com="http://schemas.openxmlformats.org/drawingml/2006/compatibility" xmlns:pvml="urn:schemas-microsoft-com:office:powerpoint" xmlns:v="urn:schemas-microsoft-com:vml" xmlns:o="urn:schemas-microsoft-com:office:office" xmlns:dgm="http://schemas.openxmlformats.org/drawingml/2006/diagram" xmlns:c="http://schemas.openxmlformats.org/drawingml/2006/chart" xmlns:mv="urn:schemas-microsoft-com:mac:vml" xmlns:mc="http://schemas.openxmlformats.org/markup-compatibility/2006" xmlns="" cellId="238:2:0"/>
                       </a:ext>
                     </a:extLst>
                   </a:tcPr>
@@ -23314,7 +23328,7 @@
                     </a:lnB>
                     <a:extLst>
                       <a:ext uri="http://customooxmlschemas.google.com/">
-                        <go:slidesCustomData xmlns="" xmlns:mc="http://schemas.openxmlformats.org/markup-compatibility/2006" xmlns:mv="urn:schemas-microsoft-com:mac:vml" xmlns:c="http://schemas.openxmlformats.org/drawingml/2006/chart" xmlns:dgm="http://schemas.openxmlformats.org/drawingml/2006/diagram" xmlns:o="urn:schemas-microsoft-com:office:office" xmlns:v="urn:schemas-microsoft-com:vml" xmlns:pvml="urn:schemas-microsoft-com:office:powerpoint" xmlns:com="http://schemas.openxmlformats.org/drawingml/2006/compatibility" xmlns:p14="http://schemas.microsoft.com/office/powerpoint/2010/main" xmlns:p15="http://schemas.microsoft.com/office/powerpoint/2012/main" xmlns:go="http://customooxmlschemas.google.com/" cellId="238:2:1"/>
+                        <go:slidesCustomData xmlns:go="http://customooxmlschemas.google.com/" xmlns:p15="http://schemas.microsoft.com/office/powerpoint/2012/main" xmlns:p14="http://schemas.microsoft.com/office/powerpoint/2010/main" xmlns:com="http://schemas.openxmlformats.org/drawingml/2006/compatibility" xmlns:pvml="urn:schemas-microsoft-com:office:powerpoint" xmlns:v="urn:schemas-microsoft-com:vml" xmlns:o="urn:schemas-microsoft-com:office:office" xmlns:dgm="http://schemas.openxmlformats.org/drawingml/2006/diagram" xmlns:c="http://schemas.openxmlformats.org/drawingml/2006/chart" xmlns:mv="urn:schemas-microsoft-com:mac:vml" xmlns:mc="http://schemas.openxmlformats.org/markup-compatibility/2006" xmlns="" cellId="238:2:1"/>
                       </a:ext>
                     </a:extLst>
                   </a:tcPr>
@@ -23382,7 +23396,7 @@
                     </a:lnB>
                     <a:extLst>
                       <a:ext uri="http://customooxmlschemas.google.com/">
-                        <go:slidesCustomData xmlns="" xmlns:mc="http://schemas.openxmlformats.org/markup-compatibility/2006" xmlns:mv="urn:schemas-microsoft-com:mac:vml" xmlns:c="http://schemas.openxmlformats.org/drawingml/2006/chart" xmlns:dgm="http://schemas.openxmlformats.org/drawingml/2006/diagram" xmlns:o="urn:schemas-microsoft-com:office:office" xmlns:v="urn:schemas-microsoft-com:vml" xmlns:pvml="urn:schemas-microsoft-com:office:powerpoint" xmlns:com="http://schemas.openxmlformats.org/drawingml/2006/compatibility" xmlns:p14="http://schemas.microsoft.com/office/powerpoint/2010/main" xmlns:p15="http://schemas.microsoft.com/office/powerpoint/2012/main" xmlns:go="http://customooxmlschemas.google.com/" cellId="238:2:2"/>
+                        <go:slidesCustomData xmlns:go="http://customooxmlschemas.google.com/" xmlns:p15="http://schemas.microsoft.com/office/powerpoint/2012/main" xmlns:p14="http://schemas.microsoft.com/office/powerpoint/2010/main" xmlns:com="http://schemas.openxmlformats.org/drawingml/2006/compatibility" xmlns:pvml="urn:schemas-microsoft-com:office:powerpoint" xmlns:v="urn:schemas-microsoft-com:vml" xmlns:o="urn:schemas-microsoft-com:office:office" xmlns:dgm="http://schemas.openxmlformats.org/drawingml/2006/diagram" xmlns:c="http://schemas.openxmlformats.org/drawingml/2006/chart" xmlns:mv="urn:schemas-microsoft-com:mac:vml" xmlns:mc="http://schemas.openxmlformats.org/markup-compatibility/2006" xmlns="" cellId="238:2:2"/>
                       </a:ext>
                     </a:extLst>
                   </a:tcPr>
@@ -23450,7 +23464,7 @@
                     </a:lnB>
                     <a:extLst>
                       <a:ext uri="http://customooxmlschemas.google.com/">
-                        <go:slidesCustomData xmlns="" xmlns:mc="http://schemas.openxmlformats.org/markup-compatibility/2006" xmlns:mv="urn:schemas-microsoft-com:mac:vml" xmlns:c="http://schemas.openxmlformats.org/drawingml/2006/chart" xmlns:dgm="http://schemas.openxmlformats.org/drawingml/2006/diagram" xmlns:o="urn:schemas-microsoft-com:office:office" xmlns:v="urn:schemas-microsoft-com:vml" xmlns:pvml="urn:schemas-microsoft-com:office:powerpoint" xmlns:com="http://schemas.openxmlformats.org/drawingml/2006/compatibility" xmlns:p14="http://schemas.microsoft.com/office/powerpoint/2010/main" xmlns:p15="http://schemas.microsoft.com/office/powerpoint/2012/main" xmlns:go="http://customooxmlschemas.google.com/" cellId="238:2:3"/>
+                        <go:slidesCustomData xmlns:go="http://customooxmlschemas.google.com/" xmlns:p15="http://schemas.microsoft.com/office/powerpoint/2012/main" xmlns:p14="http://schemas.microsoft.com/office/powerpoint/2010/main" xmlns:com="http://schemas.openxmlformats.org/drawingml/2006/compatibility" xmlns:pvml="urn:schemas-microsoft-com:office:powerpoint" xmlns:v="urn:schemas-microsoft-com:vml" xmlns:o="urn:schemas-microsoft-com:office:office" xmlns:dgm="http://schemas.openxmlformats.org/drawingml/2006/diagram" xmlns:c="http://schemas.openxmlformats.org/drawingml/2006/chart" xmlns:mv="urn:schemas-microsoft-com:mac:vml" xmlns:mc="http://schemas.openxmlformats.org/markup-compatibility/2006" xmlns="" cellId="238:2:3"/>
                       </a:ext>
                     </a:extLst>
                   </a:tcPr>
@@ -23518,7 +23532,7 @@
                     </a:lnB>
                     <a:extLst>
                       <a:ext uri="http://customooxmlschemas.google.com/">
-                        <go:slidesCustomData xmlns="" xmlns:mc="http://schemas.openxmlformats.org/markup-compatibility/2006" xmlns:mv="urn:schemas-microsoft-com:mac:vml" xmlns:c="http://schemas.openxmlformats.org/drawingml/2006/chart" xmlns:dgm="http://schemas.openxmlformats.org/drawingml/2006/diagram" xmlns:o="urn:schemas-microsoft-com:office:office" xmlns:v="urn:schemas-microsoft-com:vml" xmlns:pvml="urn:schemas-microsoft-com:office:powerpoint" xmlns:com="http://schemas.openxmlformats.org/drawingml/2006/compatibility" xmlns:p14="http://schemas.microsoft.com/office/powerpoint/2010/main" xmlns:p15="http://schemas.microsoft.com/office/powerpoint/2012/main" xmlns:go="http://customooxmlschemas.google.com/" cellId="238:2:4"/>
+                        <go:slidesCustomData xmlns:go="http://customooxmlschemas.google.com/" xmlns:p15="http://schemas.microsoft.com/office/powerpoint/2012/main" xmlns:p14="http://schemas.microsoft.com/office/powerpoint/2010/main" xmlns:com="http://schemas.openxmlformats.org/drawingml/2006/compatibility" xmlns:pvml="urn:schemas-microsoft-com:office:powerpoint" xmlns:v="urn:schemas-microsoft-com:vml" xmlns:o="urn:schemas-microsoft-com:office:office" xmlns:dgm="http://schemas.openxmlformats.org/drawingml/2006/diagram" xmlns:c="http://schemas.openxmlformats.org/drawingml/2006/chart" xmlns:mv="urn:schemas-microsoft-com:mac:vml" xmlns:mc="http://schemas.openxmlformats.org/markup-compatibility/2006" xmlns="" cellId="238:2:4"/>
                       </a:ext>
                     </a:extLst>
                   </a:tcPr>
@@ -23833,7 +23847,7 @@
               <a:rPr lang="zh-TW" sz="1800">
                 <a:extLst>
                   <a:ext uri="http://customooxmlschemas.google.com/">
-                    <go:slidesCustomData xmlns="" xmlns:mc="http://schemas.openxmlformats.org/markup-compatibility/2006" xmlns:mv="urn:schemas-microsoft-com:mac:vml" xmlns:c="http://schemas.openxmlformats.org/drawingml/2006/chart" xmlns:dgm="http://schemas.openxmlformats.org/drawingml/2006/diagram" xmlns:o="urn:schemas-microsoft-com:office:office" xmlns:v="urn:schemas-microsoft-com:vml" xmlns:pvml="urn:schemas-microsoft-com:office:powerpoint" xmlns:com="http://schemas.openxmlformats.org/drawingml/2006/compatibility" xmlns:p14="http://schemas.microsoft.com/office/powerpoint/2010/main" xmlns:p15="http://schemas.microsoft.com/office/powerpoint/2012/main" xmlns:go="http://customooxmlschemas.google.com/" textRoundtripDataId="0"/>
+                    <go:slidesCustomData xmlns:go="http://customooxmlschemas.google.com/" xmlns:p15="http://schemas.microsoft.com/office/powerpoint/2012/main" xmlns:p14="http://schemas.microsoft.com/office/powerpoint/2010/main" xmlns:com="http://schemas.openxmlformats.org/drawingml/2006/compatibility" xmlns:pvml="urn:schemas-microsoft-com:office:powerpoint" xmlns:v="urn:schemas-microsoft-com:vml" xmlns:o="urn:schemas-microsoft-com:office:office" xmlns:dgm="http://schemas.openxmlformats.org/drawingml/2006/diagram" xmlns:c="http://schemas.openxmlformats.org/drawingml/2006/chart" xmlns:mv="urn:schemas-microsoft-com:mac:vml" xmlns:mc="http://schemas.openxmlformats.org/markup-compatibility/2006" xmlns="" textRoundtripDataId="0"/>
                   </a:ext>
                 </a:extLst>
               </a:rPr>

</xml_diff>